<commit_message>
updated - add new app for hypothesis testing
</commit_message>
<xml_diff>
--- a/docs/lecture_slides/Week 11/Week11_Lecture20_Slides_3_20_2024.pptx
+++ b/docs/lecture_slides/Week 11/Week11_Lecture20_Slides_3_20_2024.pptx
@@ -274,7 +274,7 @@
           <a:p>
             <a:fld id="{16242ECF-4EC5-4F6F-92F2-C9C58BEB3FE8}" type="datetimeFigureOut">
               <a:rPr lang="en-US" smtClean="0"/>
-              <a:t>3/20/2024</a:t>
+              <a:t>3/26/2024</a:t>
             </a:fld>
             <a:endParaRPr lang="en-US"/>
           </a:p>
@@ -472,7 +472,7 @@
           <a:p>
             <a:fld id="{16242ECF-4EC5-4F6F-92F2-C9C58BEB3FE8}" type="datetimeFigureOut">
               <a:rPr lang="en-US" smtClean="0"/>
-              <a:t>3/20/2024</a:t>
+              <a:t>3/26/2024</a:t>
             </a:fld>
             <a:endParaRPr lang="en-US"/>
           </a:p>
@@ -680,7 +680,7 @@
           <a:p>
             <a:fld id="{16242ECF-4EC5-4F6F-92F2-C9C58BEB3FE8}" type="datetimeFigureOut">
               <a:rPr lang="en-US" smtClean="0"/>
-              <a:t>3/20/2024</a:t>
+              <a:t>3/26/2024</a:t>
             </a:fld>
             <a:endParaRPr lang="en-US"/>
           </a:p>
@@ -878,7 +878,7 @@
           <a:p>
             <a:fld id="{16242ECF-4EC5-4F6F-92F2-C9C58BEB3FE8}" type="datetimeFigureOut">
               <a:rPr lang="en-US" smtClean="0"/>
-              <a:t>3/20/2024</a:t>
+              <a:t>3/26/2024</a:t>
             </a:fld>
             <a:endParaRPr lang="en-US"/>
           </a:p>
@@ -1153,7 +1153,7 @@
           <a:p>
             <a:fld id="{16242ECF-4EC5-4F6F-92F2-C9C58BEB3FE8}" type="datetimeFigureOut">
               <a:rPr lang="en-US" smtClean="0"/>
-              <a:t>3/20/2024</a:t>
+              <a:t>3/26/2024</a:t>
             </a:fld>
             <a:endParaRPr lang="en-US"/>
           </a:p>
@@ -1418,7 +1418,7 @@
           <a:p>
             <a:fld id="{16242ECF-4EC5-4F6F-92F2-C9C58BEB3FE8}" type="datetimeFigureOut">
               <a:rPr lang="en-US" smtClean="0"/>
-              <a:t>3/20/2024</a:t>
+              <a:t>3/26/2024</a:t>
             </a:fld>
             <a:endParaRPr lang="en-US"/>
           </a:p>
@@ -1830,7 +1830,7 @@
           <a:p>
             <a:fld id="{16242ECF-4EC5-4F6F-92F2-C9C58BEB3FE8}" type="datetimeFigureOut">
               <a:rPr lang="en-US" smtClean="0"/>
-              <a:t>3/20/2024</a:t>
+              <a:t>3/26/2024</a:t>
             </a:fld>
             <a:endParaRPr lang="en-US"/>
           </a:p>
@@ -1971,7 +1971,7 @@
           <a:p>
             <a:fld id="{16242ECF-4EC5-4F6F-92F2-C9C58BEB3FE8}" type="datetimeFigureOut">
               <a:rPr lang="en-US" smtClean="0"/>
-              <a:t>3/20/2024</a:t>
+              <a:t>3/26/2024</a:t>
             </a:fld>
             <a:endParaRPr lang="en-US"/>
           </a:p>
@@ -2084,7 +2084,7 @@
           <a:p>
             <a:fld id="{16242ECF-4EC5-4F6F-92F2-C9C58BEB3FE8}" type="datetimeFigureOut">
               <a:rPr lang="en-US" smtClean="0"/>
-              <a:t>3/20/2024</a:t>
+              <a:t>3/26/2024</a:t>
             </a:fld>
             <a:endParaRPr lang="en-US"/>
           </a:p>
@@ -2395,7 +2395,7 @@
           <a:p>
             <a:fld id="{16242ECF-4EC5-4F6F-92F2-C9C58BEB3FE8}" type="datetimeFigureOut">
               <a:rPr lang="en-US" smtClean="0"/>
-              <a:t>3/20/2024</a:t>
+              <a:t>3/26/2024</a:t>
             </a:fld>
             <a:endParaRPr lang="en-US"/>
           </a:p>
@@ -2683,7 +2683,7 @@
           <a:p>
             <a:fld id="{16242ECF-4EC5-4F6F-92F2-C9C58BEB3FE8}" type="datetimeFigureOut">
               <a:rPr lang="en-US" smtClean="0"/>
-              <a:t>3/20/2024</a:t>
+              <a:t>3/26/2024</a:t>
             </a:fld>
             <a:endParaRPr lang="en-US"/>
           </a:p>
@@ -2924,7 +2924,7 @@
           <a:p>
             <a:fld id="{16242ECF-4EC5-4F6F-92F2-C9C58BEB3FE8}" type="datetimeFigureOut">
               <a:rPr lang="en-US" smtClean="0"/>
-              <a:t>3/20/2024</a:t>
+              <a:t>3/26/2024</a:t>
             </a:fld>
             <a:endParaRPr lang="en-US"/>
           </a:p>
@@ -3370,15 +3370,19 @@
           <a:lstStyle/>
           <a:p>
             <a:r>
-              <a:rPr lang="en-US" dirty="0"/>
-              <a:t>Lecture 20</a:t>
+              <a:rPr lang="en-US"/>
+              <a:t>Lectures 20 - 21</a:t>
             </a:r>
             <a:br>
               <a:rPr lang="en-US" dirty="0"/>
             </a:br>
             <a:r>
               <a:rPr lang="en-US" dirty="0"/>
-              <a:t>Introduction to Confidence Intervals</a:t>
+              <a:t>Introduction to </a:t>
+            </a:r>
+            <a:r>
+              <a:rPr lang="en-US"/>
+              <a:t>Significance Tests</a:t>
             </a:r>
             <a:br>
               <a:rPr lang="en-US" dirty="0"/>
@@ -3517,8 +3521,8 @@
           </p:sp>
         </mc:Fallback>
       </mc:AlternateContent>
-      <mc:AlternateContent xmlns:mc="http://schemas.openxmlformats.org/markup-compatibility/2006">
-        <mc:Choice xmlns:a14="http://schemas.microsoft.com/office/drawing/2010/main" Requires="a14">
+      <mc:AlternateContent xmlns:mc="http://schemas.openxmlformats.org/markup-compatibility/2006" xmlns:a14="http://schemas.microsoft.com/office/drawing/2010/main">
+        <mc:Choice Requires="a14">
           <p:sp>
             <p:nvSpPr>
               <p:cNvPr id="3" name="Content Placeholder 2">
@@ -3821,7 +3825,7 @@
             </p:txBody>
           </p:sp>
         </mc:Choice>
-        <mc:Fallback>
+        <mc:Fallback xmlns="">
           <p:sp>
             <p:nvSpPr>
               <p:cNvPr id="3" name="Content Placeholder 2">
@@ -6517,8 +6521,8 @@
           </a:p>
         </p:txBody>
       </p:sp>
-      <mc:AlternateContent xmlns:mc="http://schemas.openxmlformats.org/markup-compatibility/2006">
-        <mc:Choice xmlns:a14="http://schemas.microsoft.com/office/drawing/2010/main" Requires="a14">
+      <mc:AlternateContent xmlns:mc="http://schemas.openxmlformats.org/markup-compatibility/2006" xmlns:a14="http://schemas.microsoft.com/office/drawing/2010/main">
+        <mc:Choice Requires="a14">
           <p:graphicFrame>
             <p:nvGraphicFramePr>
               <p:cNvPr id="4" name="Table 3">
@@ -7921,7 +7925,7 @@
             </a:graphic>
           </p:graphicFrame>
         </mc:Choice>
-        <mc:Fallback>
+        <mc:Fallback xmlns="">
           <p:graphicFrame>
             <p:nvGraphicFramePr>
               <p:cNvPr id="4" name="Table 3">
@@ -8414,8 +8418,8 @@
           </p:graphicFrame>
         </mc:Fallback>
       </mc:AlternateContent>
-      <mc:AlternateContent xmlns:mc="http://schemas.openxmlformats.org/markup-compatibility/2006">
-        <mc:Choice xmlns:a14="http://schemas.microsoft.com/office/drawing/2010/main" Requires="a14">
+      <mc:AlternateContent xmlns:mc="http://schemas.openxmlformats.org/markup-compatibility/2006" xmlns:a14="http://schemas.microsoft.com/office/drawing/2010/main">
+        <mc:Choice Requires="a14">
           <p:sp>
             <p:nvSpPr>
               <p:cNvPr id="6" name="TextBox 5">
@@ -8506,7 +8510,7 @@
             </p:txBody>
           </p:sp>
         </mc:Choice>
-        <mc:Fallback>
+        <mc:Fallback xmlns="">
           <p:sp>
             <p:nvSpPr>
               <p:cNvPr id="6" name="TextBox 5">
@@ -9088,8 +9092,8 @@
           </a:p>
         </p:txBody>
       </p:sp>
-      <mc:AlternateContent xmlns:mc="http://schemas.openxmlformats.org/markup-compatibility/2006">
-        <mc:Choice xmlns:a14="http://schemas.microsoft.com/office/drawing/2010/main" Requires="a14">
+      <mc:AlternateContent xmlns:mc="http://schemas.openxmlformats.org/markup-compatibility/2006" xmlns:a14="http://schemas.microsoft.com/office/drawing/2010/main">
+        <mc:Choice Requires="a14">
           <p:sp>
             <p:nvSpPr>
               <p:cNvPr id="3" name="Content Placeholder 2">
@@ -9224,7 +9228,7 @@
             </p:txBody>
           </p:sp>
         </mc:Choice>
-        <mc:Fallback>
+        <mc:Fallback xmlns="">
           <p:sp>
             <p:nvSpPr>
               <p:cNvPr id="3" name="Content Placeholder 2">
@@ -9352,8 +9356,8 @@
           </a:p>
         </p:txBody>
       </p:sp>
-      <mc:AlternateContent xmlns:mc="http://schemas.openxmlformats.org/markup-compatibility/2006">
-        <mc:Choice xmlns:a14="http://schemas.microsoft.com/office/drawing/2010/main" Requires="a14">
+      <mc:AlternateContent xmlns:mc="http://schemas.openxmlformats.org/markup-compatibility/2006" xmlns:a14="http://schemas.microsoft.com/office/drawing/2010/main">
+        <mc:Choice Requires="a14">
           <p:sp>
             <p:nvSpPr>
               <p:cNvPr id="3" name="Content Placeholder 2">
@@ -9607,7 +9611,7 @@
             </p:txBody>
           </p:sp>
         </mc:Choice>
-        <mc:Fallback>
+        <mc:Fallback xmlns="">
           <p:sp>
             <p:nvSpPr>
               <p:cNvPr id="3" name="Content Placeholder 2">

</xml_diff>